<commit_message>
refactor to header file
split out class definitions and implementation in preparation for application hooks
</commit_message>
<xml_diff>
--- a/Documents/ObjectFlow.pptx
+++ b/Documents/ObjectFlow.pptx
@@ -5032,15 +5032,7 @@
           <a:p>
             <a:r>
               <a:rPr lang="en-US" dirty="0"/>
-              <a:t>Code generation involves serialization of the objects and resources into a </a:t>
-            </a:r>
-            <a:r>
-              <a:rPr lang="en-US" dirty="0" err="1"/>
-              <a:t>c++</a:t>
-            </a:r>
-            <a:r>
-              <a:rPr lang="en-US" dirty="0"/>
-              <a:t> header file, and packaging of the implementation code for the application objects (time and data event handlers)</a:t>
+              <a:t>Code generation involves serialization of the objects and resources into a C++ header file, and packaging of the implementation code for the application objects (time and data event handlers)</a:t>
             </a:r>
           </a:p>
           <a:p>

</xml_diff>

<commit_message>
fix the null pointer on first object problem
fix the null pointer on first object problem
</commit_message>
<xml_diff>
--- a/Documents/ObjectFlow.pptx
+++ b/Documents/ObjectFlow.pptx
@@ -3532,7 +3532,7 @@
             </a:r>
             <a:r>
               <a:rPr lang="en-US" dirty="0"/>
-              <a:t> – DFG Communication</a:t>
+              <a:t> – DFG and Reactive Communication</a:t>
             </a:r>
           </a:p>
         </p:txBody>
@@ -3867,202 +3867,6 @@
                 <a:t>OutputLink</a:t>
               </a:r>
               <a:endParaRPr lang="en-US" dirty="0"/>
-            </a:p>
-          </p:txBody>
-        </p:sp>
-        <p:sp>
-          <p:nvSpPr>
-            <p:cNvPr id="10" name="Rectangle 9">
-              <a:extLst>
-                <a:ext uri="{FF2B5EF4-FFF2-40B4-BE49-F238E27FC236}">
-                  <a16:creationId xmlns:a16="http://schemas.microsoft.com/office/drawing/2014/main" id="{C79DBDC4-9B60-BC4B-AA04-D99554401E6E}"/>
-                </a:ext>
-              </a:extLst>
-            </p:cNvPr>
-            <p:cNvSpPr/>
-            <p:nvPr/>
-          </p:nvSpPr>
-          <p:spPr>
-            <a:xfrm>
-              <a:off x="3030415" y="4461005"/>
-              <a:ext cx="1477108" cy="304800"/>
-            </a:xfrm>
-            <a:prstGeom prst="rect">
-              <a:avLst/>
-            </a:prstGeom>
-          </p:spPr>
-          <p:style>
-            <a:lnRef idx="2">
-              <a:schemeClr val="accent1">
-                <a:shade val="50000"/>
-              </a:schemeClr>
-            </a:lnRef>
-            <a:fillRef idx="1">
-              <a:schemeClr val="accent1"/>
-            </a:fillRef>
-            <a:effectRef idx="0">
-              <a:schemeClr val="accent1"/>
-            </a:effectRef>
-            <a:fontRef idx="minor">
-              <a:schemeClr val="lt1"/>
-            </a:fontRef>
-          </p:style>
-          <p:txBody>
-            <a:bodyPr rtlCol="0" anchor="ctr"/>
-            <a:lstStyle/>
-            <a:p>
-              <a:pPr algn="ctr"/>
-              <a:r>
-                <a:rPr lang="en-US" dirty="0"/>
-                <a:t>Application</a:t>
-              </a:r>
-            </a:p>
-          </p:txBody>
-        </p:sp>
-        <p:sp>
-          <p:nvSpPr>
-            <p:cNvPr id="11" name="Rectangle 10">
-              <a:extLst>
-                <a:ext uri="{FF2B5EF4-FFF2-40B4-BE49-F238E27FC236}">
-                  <a16:creationId xmlns:a16="http://schemas.microsoft.com/office/drawing/2014/main" id="{3BB4AF1B-C4EA-6D43-A2F6-B26613CF310E}"/>
-                </a:ext>
-              </a:extLst>
-            </p:cNvPr>
-            <p:cNvSpPr/>
-            <p:nvPr/>
-          </p:nvSpPr>
-          <p:spPr>
-            <a:xfrm>
-              <a:off x="3182815" y="4613405"/>
-              <a:ext cx="1477108" cy="304800"/>
-            </a:xfrm>
-            <a:prstGeom prst="rect">
-              <a:avLst/>
-            </a:prstGeom>
-          </p:spPr>
-          <p:style>
-            <a:lnRef idx="2">
-              <a:schemeClr val="accent1">
-                <a:shade val="50000"/>
-              </a:schemeClr>
-            </a:lnRef>
-            <a:fillRef idx="1">
-              <a:schemeClr val="accent1"/>
-            </a:fillRef>
-            <a:effectRef idx="0">
-              <a:schemeClr val="accent1"/>
-            </a:effectRef>
-            <a:fontRef idx="minor">
-              <a:schemeClr val="lt1"/>
-            </a:fontRef>
-          </p:style>
-          <p:txBody>
-            <a:bodyPr rtlCol="0" anchor="ctr"/>
-            <a:lstStyle/>
-            <a:p>
-              <a:pPr algn="ctr"/>
-              <a:r>
-                <a:rPr lang="en-US" dirty="0"/>
-                <a:t>Application</a:t>
-              </a:r>
-            </a:p>
-          </p:txBody>
-        </p:sp>
-        <p:sp>
-          <p:nvSpPr>
-            <p:cNvPr id="12" name="Rectangle 11">
-              <a:extLst>
-                <a:ext uri="{FF2B5EF4-FFF2-40B4-BE49-F238E27FC236}">
-                  <a16:creationId xmlns:a16="http://schemas.microsoft.com/office/drawing/2014/main" id="{7EA3F8F9-7100-B04A-844F-B7BD77561B5D}"/>
-                </a:ext>
-              </a:extLst>
-            </p:cNvPr>
-            <p:cNvSpPr/>
-            <p:nvPr/>
-          </p:nvSpPr>
-          <p:spPr>
-            <a:xfrm>
-              <a:off x="3335215" y="4765805"/>
-              <a:ext cx="1477108" cy="304800"/>
-            </a:xfrm>
-            <a:prstGeom prst="rect">
-              <a:avLst/>
-            </a:prstGeom>
-          </p:spPr>
-          <p:style>
-            <a:lnRef idx="2">
-              <a:schemeClr val="accent1">
-                <a:shade val="50000"/>
-              </a:schemeClr>
-            </a:lnRef>
-            <a:fillRef idx="1">
-              <a:schemeClr val="accent1"/>
-            </a:fillRef>
-            <a:effectRef idx="0">
-              <a:schemeClr val="accent1"/>
-            </a:effectRef>
-            <a:fontRef idx="minor">
-              <a:schemeClr val="lt1"/>
-            </a:fontRef>
-          </p:style>
-          <p:txBody>
-            <a:bodyPr rtlCol="0" anchor="ctr"/>
-            <a:lstStyle/>
-            <a:p>
-              <a:pPr algn="ctr"/>
-              <a:r>
-                <a:rPr lang="en-US" dirty="0"/>
-                <a:t>Application</a:t>
-              </a:r>
-            </a:p>
-          </p:txBody>
-        </p:sp>
-        <p:sp>
-          <p:nvSpPr>
-            <p:cNvPr id="13" name="Rectangle 12">
-              <a:extLst>
-                <a:ext uri="{FF2B5EF4-FFF2-40B4-BE49-F238E27FC236}">
-                  <a16:creationId xmlns:a16="http://schemas.microsoft.com/office/drawing/2014/main" id="{7BA6D519-DC1F-8D4C-BEC6-A214E52FEF8E}"/>
-                </a:ext>
-              </a:extLst>
-            </p:cNvPr>
-            <p:cNvSpPr/>
-            <p:nvPr/>
-          </p:nvSpPr>
-          <p:spPr>
-            <a:xfrm>
-              <a:off x="3487615" y="4918205"/>
-              <a:ext cx="1477108" cy="304800"/>
-            </a:xfrm>
-            <a:prstGeom prst="rect">
-              <a:avLst/>
-            </a:prstGeom>
-          </p:spPr>
-          <p:style>
-            <a:lnRef idx="2">
-              <a:schemeClr val="accent1">
-                <a:shade val="50000"/>
-              </a:schemeClr>
-            </a:lnRef>
-            <a:fillRef idx="1">
-              <a:schemeClr val="accent1"/>
-            </a:fillRef>
-            <a:effectRef idx="0">
-              <a:schemeClr val="accent1"/>
-            </a:effectRef>
-            <a:fontRef idx="minor">
-              <a:schemeClr val="lt1"/>
-            </a:fontRef>
-          </p:style>
-          <p:txBody>
-            <a:bodyPr rtlCol="0" anchor="ctr"/>
-            <a:lstStyle/>
-            <a:p>
-              <a:pPr algn="ctr"/>
-              <a:r>
-                <a:rPr lang="en-US" dirty="0"/>
-                <a:t>Application</a:t>
-              </a:r>
             </a:p>
           </p:txBody>
         </p:sp>
@@ -4442,202 +4246,6 @@
         </p:sp>
         <p:sp>
           <p:nvSpPr>
-            <p:cNvPr id="23" name="Rectangle 22">
-              <a:extLst>
-                <a:ext uri="{FF2B5EF4-FFF2-40B4-BE49-F238E27FC236}">
-                  <a16:creationId xmlns:a16="http://schemas.microsoft.com/office/drawing/2014/main" id="{DF4925A1-4E38-8942-B41F-D8B649988EFE}"/>
-                </a:ext>
-              </a:extLst>
-            </p:cNvPr>
-            <p:cNvSpPr/>
-            <p:nvPr/>
-          </p:nvSpPr>
-          <p:spPr>
-            <a:xfrm>
-              <a:off x="3030415" y="4461005"/>
-              <a:ext cx="1477108" cy="304800"/>
-            </a:xfrm>
-            <a:prstGeom prst="rect">
-              <a:avLst/>
-            </a:prstGeom>
-          </p:spPr>
-          <p:style>
-            <a:lnRef idx="2">
-              <a:schemeClr val="accent1">
-                <a:shade val="50000"/>
-              </a:schemeClr>
-            </a:lnRef>
-            <a:fillRef idx="1">
-              <a:schemeClr val="accent1"/>
-            </a:fillRef>
-            <a:effectRef idx="0">
-              <a:schemeClr val="accent1"/>
-            </a:effectRef>
-            <a:fontRef idx="minor">
-              <a:schemeClr val="lt1"/>
-            </a:fontRef>
-          </p:style>
-          <p:txBody>
-            <a:bodyPr rtlCol="0" anchor="ctr"/>
-            <a:lstStyle/>
-            <a:p>
-              <a:pPr algn="ctr"/>
-              <a:r>
-                <a:rPr lang="en-US" dirty="0"/>
-                <a:t>Application</a:t>
-              </a:r>
-            </a:p>
-          </p:txBody>
-        </p:sp>
-        <p:sp>
-          <p:nvSpPr>
-            <p:cNvPr id="24" name="Rectangle 23">
-              <a:extLst>
-                <a:ext uri="{FF2B5EF4-FFF2-40B4-BE49-F238E27FC236}">
-                  <a16:creationId xmlns:a16="http://schemas.microsoft.com/office/drawing/2014/main" id="{9A434D36-1AEB-8B42-85D8-D03104CD1EB7}"/>
-                </a:ext>
-              </a:extLst>
-            </p:cNvPr>
-            <p:cNvSpPr/>
-            <p:nvPr/>
-          </p:nvSpPr>
-          <p:spPr>
-            <a:xfrm>
-              <a:off x="3182815" y="4613405"/>
-              <a:ext cx="1477108" cy="304800"/>
-            </a:xfrm>
-            <a:prstGeom prst="rect">
-              <a:avLst/>
-            </a:prstGeom>
-          </p:spPr>
-          <p:style>
-            <a:lnRef idx="2">
-              <a:schemeClr val="accent1">
-                <a:shade val="50000"/>
-              </a:schemeClr>
-            </a:lnRef>
-            <a:fillRef idx="1">
-              <a:schemeClr val="accent1"/>
-            </a:fillRef>
-            <a:effectRef idx="0">
-              <a:schemeClr val="accent1"/>
-            </a:effectRef>
-            <a:fontRef idx="minor">
-              <a:schemeClr val="lt1"/>
-            </a:fontRef>
-          </p:style>
-          <p:txBody>
-            <a:bodyPr rtlCol="0" anchor="ctr"/>
-            <a:lstStyle/>
-            <a:p>
-              <a:pPr algn="ctr"/>
-              <a:r>
-                <a:rPr lang="en-US" dirty="0"/>
-                <a:t>Application</a:t>
-              </a:r>
-            </a:p>
-          </p:txBody>
-        </p:sp>
-        <p:sp>
-          <p:nvSpPr>
-            <p:cNvPr id="25" name="Rectangle 24">
-              <a:extLst>
-                <a:ext uri="{FF2B5EF4-FFF2-40B4-BE49-F238E27FC236}">
-                  <a16:creationId xmlns:a16="http://schemas.microsoft.com/office/drawing/2014/main" id="{03C6E5F6-F825-6A4A-BB50-EA80E1DD917A}"/>
-                </a:ext>
-              </a:extLst>
-            </p:cNvPr>
-            <p:cNvSpPr/>
-            <p:nvPr/>
-          </p:nvSpPr>
-          <p:spPr>
-            <a:xfrm>
-              <a:off x="3335215" y="4765805"/>
-              <a:ext cx="1477108" cy="304800"/>
-            </a:xfrm>
-            <a:prstGeom prst="rect">
-              <a:avLst/>
-            </a:prstGeom>
-          </p:spPr>
-          <p:style>
-            <a:lnRef idx="2">
-              <a:schemeClr val="accent1">
-                <a:shade val="50000"/>
-              </a:schemeClr>
-            </a:lnRef>
-            <a:fillRef idx="1">
-              <a:schemeClr val="accent1"/>
-            </a:fillRef>
-            <a:effectRef idx="0">
-              <a:schemeClr val="accent1"/>
-            </a:effectRef>
-            <a:fontRef idx="minor">
-              <a:schemeClr val="lt1"/>
-            </a:fontRef>
-          </p:style>
-          <p:txBody>
-            <a:bodyPr rtlCol="0" anchor="ctr"/>
-            <a:lstStyle/>
-            <a:p>
-              <a:pPr algn="ctr"/>
-              <a:r>
-                <a:rPr lang="en-US" dirty="0"/>
-                <a:t>Application</a:t>
-              </a:r>
-            </a:p>
-          </p:txBody>
-        </p:sp>
-        <p:sp>
-          <p:nvSpPr>
-            <p:cNvPr id="26" name="Rectangle 25">
-              <a:extLst>
-                <a:ext uri="{FF2B5EF4-FFF2-40B4-BE49-F238E27FC236}">
-                  <a16:creationId xmlns:a16="http://schemas.microsoft.com/office/drawing/2014/main" id="{108D7459-9D8A-C247-996C-77AAFECF9F2B}"/>
-                </a:ext>
-              </a:extLst>
-            </p:cNvPr>
-            <p:cNvSpPr/>
-            <p:nvPr/>
-          </p:nvSpPr>
-          <p:spPr>
-            <a:xfrm>
-              <a:off x="3487615" y="4918205"/>
-              <a:ext cx="1477108" cy="304800"/>
-            </a:xfrm>
-            <a:prstGeom prst="rect">
-              <a:avLst/>
-            </a:prstGeom>
-          </p:spPr>
-          <p:style>
-            <a:lnRef idx="2">
-              <a:schemeClr val="accent1">
-                <a:shade val="50000"/>
-              </a:schemeClr>
-            </a:lnRef>
-            <a:fillRef idx="1">
-              <a:schemeClr val="accent1"/>
-            </a:fillRef>
-            <a:effectRef idx="0">
-              <a:schemeClr val="accent1"/>
-            </a:effectRef>
-            <a:fontRef idx="minor">
-              <a:schemeClr val="lt1"/>
-            </a:fontRef>
-          </p:style>
-          <p:txBody>
-            <a:bodyPr rtlCol="0" anchor="ctr"/>
-            <a:lstStyle/>
-            <a:p>
-              <a:pPr algn="ctr"/>
-              <a:r>
-                <a:rPr lang="en-US" dirty="0"/>
-                <a:t>Application</a:t>
-              </a:r>
-            </a:p>
-          </p:txBody>
-        </p:sp>
-        <p:sp>
-          <p:nvSpPr>
             <p:cNvPr id="27" name="TextBox 26">
               <a:extLst>
                 <a:ext uri="{FF2B5EF4-FFF2-40B4-BE49-F238E27FC236}">
@@ -4770,8 +4378,8 @@
         </p:nvSpPr>
         <p:spPr>
           <a:xfrm>
-            <a:off x="6098930" y="3385404"/>
-            <a:ext cx="2479432" cy="1175787"/>
+            <a:off x="5883697" y="3544019"/>
+            <a:ext cx="2297724" cy="837782"/>
           </a:xfrm>
           <a:prstGeom prst="ellipse">
             <a:avLst/>
@@ -4802,9 +4410,448 @@
               <a:rPr lang="en-US" dirty="0" err="1"/>
               <a:t>onValueUpdate</a:t>
             </a:r>
+            <a:endParaRPr lang="en-US" dirty="0"/>
+          </a:p>
+        </p:txBody>
+      </p:sp>
+      <p:sp>
+        <p:nvSpPr>
+          <p:cNvPr id="31" name="Oval 30">
+            <a:extLst>
+              <a:ext uri="{FF2B5EF4-FFF2-40B4-BE49-F238E27FC236}">
+                <a16:creationId xmlns:a16="http://schemas.microsoft.com/office/drawing/2014/main" id="{26962D33-EA5B-564C-88C3-C599BB93FA38}"/>
+              </a:ext>
+            </a:extLst>
+          </p:cNvPr>
+          <p:cNvSpPr/>
+          <p:nvPr/>
+        </p:nvSpPr>
+        <p:spPr>
+          <a:xfrm>
+            <a:off x="2293862" y="3578100"/>
+            <a:ext cx="2297724" cy="837782"/>
+          </a:xfrm>
+          <a:prstGeom prst="ellipse">
+            <a:avLst/>
+          </a:prstGeom>
+        </p:spPr>
+        <p:style>
+          <a:lnRef idx="2">
+            <a:schemeClr val="accent1">
+              <a:shade val="50000"/>
+            </a:schemeClr>
+          </a:lnRef>
+          <a:fillRef idx="1">
+            <a:schemeClr val="accent1"/>
+          </a:fillRef>
+          <a:effectRef idx="0">
+            <a:schemeClr val="accent1"/>
+          </a:effectRef>
+          <a:fontRef idx="minor">
+            <a:schemeClr val="lt1"/>
+          </a:fontRef>
+        </p:style>
+        <p:txBody>
+          <a:bodyPr rtlCol="0" anchor="ctr"/>
+          <a:lstStyle/>
+          <a:p>
+            <a:pPr algn="ctr"/>
+            <a:r>
+              <a:rPr lang="en-US" dirty="0" err="1"/>
+              <a:t>outputSync</a:t>
+            </a:r>
+            <a:endParaRPr lang="en-US" dirty="0"/>
+          </a:p>
+        </p:txBody>
+      </p:sp>
+      <p:sp>
+        <p:nvSpPr>
+          <p:cNvPr id="32" name="Oval 31">
+            <a:extLst>
+              <a:ext uri="{FF2B5EF4-FFF2-40B4-BE49-F238E27FC236}">
+                <a16:creationId xmlns:a16="http://schemas.microsoft.com/office/drawing/2014/main" id="{F2141EE8-5DE4-424F-99E7-EC62212697B3}"/>
+              </a:ext>
+            </a:extLst>
+          </p:cNvPr>
+          <p:cNvSpPr/>
+          <p:nvPr/>
+        </p:nvSpPr>
+        <p:spPr>
+          <a:xfrm>
+            <a:off x="798454" y="4247113"/>
+            <a:ext cx="1428929" cy="380889"/>
+          </a:xfrm>
+          <a:prstGeom prst="ellipse">
+            <a:avLst/>
+          </a:prstGeom>
+        </p:spPr>
+        <p:style>
+          <a:lnRef idx="2">
+            <a:schemeClr val="accent1">
+              <a:shade val="50000"/>
+            </a:schemeClr>
+          </a:lnRef>
+          <a:fillRef idx="1">
+            <a:schemeClr val="accent1"/>
+          </a:fillRef>
+          <a:effectRef idx="0">
+            <a:schemeClr val="accent1"/>
+          </a:effectRef>
+          <a:fontRef idx="minor">
+            <a:schemeClr val="lt1"/>
+          </a:fontRef>
+        </p:style>
+        <p:txBody>
+          <a:bodyPr rtlCol="0" anchor="ctr"/>
+          <a:lstStyle/>
+          <a:p>
+            <a:pPr algn="ctr"/>
             <a:r>
               <a:rPr lang="en-US" dirty="0"/>
-              <a:t> Handler</a:t>
+              <a:t>handler</a:t>
+            </a:r>
+          </a:p>
+        </p:txBody>
+      </p:sp>
+      <p:sp>
+        <p:nvSpPr>
+          <p:cNvPr id="33" name="Oval 32">
+            <a:extLst>
+              <a:ext uri="{FF2B5EF4-FFF2-40B4-BE49-F238E27FC236}">
+                <a16:creationId xmlns:a16="http://schemas.microsoft.com/office/drawing/2014/main" id="{A41F446A-3764-6F42-A084-7A2A4C65DA1A}"/>
+              </a:ext>
+            </a:extLst>
+          </p:cNvPr>
+          <p:cNvSpPr/>
+          <p:nvPr/>
+        </p:nvSpPr>
+        <p:spPr>
+          <a:xfrm>
+            <a:off x="950854" y="4399513"/>
+            <a:ext cx="1428929" cy="380889"/>
+          </a:xfrm>
+          <a:prstGeom prst="ellipse">
+            <a:avLst/>
+          </a:prstGeom>
+        </p:spPr>
+        <p:style>
+          <a:lnRef idx="2">
+            <a:schemeClr val="accent1">
+              <a:shade val="50000"/>
+            </a:schemeClr>
+          </a:lnRef>
+          <a:fillRef idx="1">
+            <a:schemeClr val="accent1"/>
+          </a:fillRef>
+          <a:effectRef idx="0">
+            <a:schemeClr val="accent1"/>
+          </a:effectRef>
+          <a:fontRef idx="minor">
+            <a:schemeClr val="lt1"/>
+          </a:fontRef>
+        </p:style>
+        <p:txBody>
+          <a:bodyPr rtlCol="0" anchor="ctr"/>
+          <a:lstStyle/>
+          <a:p>
+            <a:pPr algn="ctr"/>
+            <a:r>
+              <a:rPr lang="en-US" dirty="0"/>
+              <a:t>handler</a:t>
+            </a:r>
+          </a:p>
+        </p:txBody>
+      </p:sp>
+      <p:sp>
+        <p:nvSpPr>
+          <p:cNvPr id="34" name="Oval 33">
+            <a:extLst>
+              <a:ext uri="{FF2B5EF4-FFF2-40B4-BE49-F238E27FC236}">
+                <a16:creationId xmlns:a16="http://schemas.microsoft.com/office/drawing/2014/main" id="{05FB7A24-5F1F-6F4B-AABD-8BD4AC5054F9}"/>
+              </a:ext>
+            </a:extLst>
+          </p:cNvPr>
+          <p:cNvSpPr/>
+          <p:nvPr/>
+        </p:nvSpPr>
+        <p:spPr>
+          <a:xfrm>
+            <a:off x="1103254" y="4551913"/>
+            <a:ext cx="1428929" cy="380889"/>
+          </a:xfrm>
+          <a:prstGeom prst="ellipse">
+            <a:avLst/>
+          </a:prstGeom>
+        </p:spPr>
+        <p:style>
+          <a:lnRef idx="2">
+            <a:schemeClr val="accent1">
+              <a:shade val="50000"/>
+            </a:schemeClr>
+          </a:lnRef>
+          <a:fillRef idx="1">
+            <a:schemeClr val="accent1"/>
+          </a:fillRef>
+          <a:effectRef idx="0">
+            <a:schemeClr val="accent1"/>
+          </a:effectRef>
+          <a:fontRef idx="minor">
+            <a:schemeClr val="lt1"/>
+          </a:fontRef>
+        </p:style>
+        <p:txBody>
+          <a:bodyPr rtlCol="0" anchor="ctr"/>
+          <a:lstStyle/>
+          <a:p>
+            <a:pPr algn="ctr"/>
+            <a:r>
+              <a:rPr lang="en-US" dirty="0"/>
+              <a:t>handler</a:t>
+            </a:r>
+          </a:p>
+        </p:txBody>
+      </p:sp>
+      <p:sp>
+        <p:nvSpPr>
+          <p:cNvPr id="36" name="Oval 35">
+            <a:extLst>
+              <a:ext uri="{FF2B5EF4-FFF2-40B4-BE49-F238E27FC236}">
+                <a16:creationId xmlns:a16="http://schemas.microsoft.com/office/drawing/2014/main" id="{E582A4AF-95F7-1245-B989-E25D99EE65C9}"/>
+              </a:ext>
+            </a:extLst>
+          </p:cNvPr>
+          <p:cNvSpPr/>
+          <p:nvPr/>
+        </p:nvSpPr>
+        <p:spPr>
+          <a:xfrm>
+            <a:off x="1255654" y="4704313"/>
+            <a:ext cx="1428929" cy="380889"/>
+          </a:xfrm>
+          <a:prstGeom prst="ellipse">
+            <a:avLst/>
+          </a:prstGeom>
+        </p:spPr>
+        <p:style>
+          <a:lnRef idx="2">
+            <a:schemeClr val="accent1">
+              <a:shade val="50000"/>
+            </a:schemeClr>
+          </a:lnRef>
+          <a:fillRef idx="1">
+            <a:schemeClr val="accent1"/>
+          </a:fillRef>
+          <a:effectRef idx="0">
+            <a:schemeClr val="accent1"/>
+          </a:effectRef>
+          <a:fontRef idx="minor">
+            <a:schemeClr val="lt1"/>
+          </a:fontRef>
+        </p:style>
+        <p:txBody>
+          <a:bodyPr rtlCol="0" anchor="ctr"/>
+          <a:lstStyle/>
+          <a:p>
+            <a:pPr algn="ctr"/>
+            <a:r>
+              <a:rPr lang="en-US" dirty="0"/>
+              <a:t>handler</a:t>
+            </a:r>
+          </a:p>
+        </p:txBody>
+      </p:sp>
+      <p:sp>
+        <p:nvSpPr>
+          <p:cNvPr id="37" name="Oval 36">
+            <a:extLst>
+              <a:ext uri="{FF2B5EF4-FFF2-40B4-BE49-F238E27FC236}">
+                <a16:creationId xmlns:a16="http://schemas.microsoft.com/office/drawing/2014/main" id="{4724212A-AA39-1D40-BE5A-2824B05A2D4E}"/>
+              </a:ext>
+            </a:extLst>
+          </p:cNvPr>
+          <p:cNvSpPr/>
+          <p:nvPr/>
+        </p:nvSpPr>
+        <p:spPr>
+          <a:xfrm>
+            <a:off x="5025647" y="4260421"/>
+            <a:ext cx="1428929" cy="380889"/>
+          </a:xfrm>
+          <a:prstGeom prst="ellipse">
+            <a:avLst/>
+          </a:prstGeom>
+        </p:spPr>
+        <p:style>
+          <a:lnRef idx="2">
+            <a:schemeClr val="accent1">
+              <a:shade val="50000"/>
+            </a:schemeClr>
+          </a:lnRef>
+          <a:fillRef idx="1">
+            <a:schemeClr val="accent1"/>
+          </a:fillRef>
+          <a:effectRef idx="0">
+            <a:schemeClr val="accent1"/>
+          </a:effectRef>
+          <a:fontRef idx="minor">
+            <a:schemeClr val="lt1"/>
+          </a:fontRef>
+        </p:style>
+        <p:txBody>
+          <a:bodyPr rtlCol="0" anchor="ctr"/>
+          <a:lstStyle/>
+          <a:p>
+            <a:pPr algn="ctr"/>
+            <a:r>
+              <a:rPr lang="en-US" dirty="0"/>
+              <a:t>handler</a:t>
+            </a:r>
+          </a:p>
+        </p:txBody>
+      </p:sp>
+      <p:sp>
+        <p:nvSpPr>
+          <p:cNvPr id="38" name="Oval 37">
+            <a:extLst>
+              <a:ext uri="{FF2B5EF4-FFF2-40B4-BE49-F238E27FC236}">
+                <a16:creationId xmlns:a16="http://schemas.microsoft.com/office/drawing/2014/main" id="{FAD0FACA-9C2E-1146-84BE-8B135E7FC658}"/>
+              </a:ext>
+            </a:extLst>
+          </p:cNvPr>
+          <p:cNvSpPr/>
+          <p:nvPr/>
+        </p:nvSpPr>
+        <p:spPr>
+          <a:xfrm>
+            <a:off x="5178047" y="4412821"/>
+            <a:ext cx="1428929" cy="380889"/>
+          </a:xfrm>
+          <a:prstGeom prst="ellipse">
+            <a:avLst/>
+          </a:prstGeom>
+        </p:spPr>
+        <p:style>
+          <a:lnRef idx="2">
+            <a:schemeClr val="accent1">
+              <a:shade val="50000"/>
+            </a:schemeClr>
+          </a:lnRef>
+          <a:fillRef idx="1">
+            <a:schemeClr val="accent1"/>
+          </a:fillRef>
+          <a:effectRef idx="0">
+            <a:schemeClr val="accent1"/>
+          </a:effectRef>
+          <a:fontRef idx="minor">
+            <a:schemeClr val="lt1"/>
+          </a:fontRef>
+        </p:style>
+        <p:txBody>
+          <a:bodyPr rtlCol="0" anchor="ctr"/>
+          <a:lstStyle/>
+          <a:p>
+            <a:pPr algn="ctr"/>
+            <a:r>
+              <a:rPr lang="en-US" dirty="0"/>
+              <a:t>handler</a:t>
+            </a:r>
+          </a:p>
+        </p:txBody>
+      </p:sp>
+      <p:sp>
+        <p:nvSpPr>
+          <p:cNvPr id="39" name="Oval 38">
+            <a:extLst>
+              <a:ext uri="{FF2B5EF4-FFF2-40B4-BE49-F238E27FC236}">
+                <a16:creationId xmlns:a16="http://schemas.microsoft.com/office/drawing/2014/main" id="{CE9D1104-8676-814F-AB9E-B357A11AD1A4}"/>
+              </a:ext>
+            </a:extLst>
+          </p:cNvPr>
+          <p:cNvSpPr/>
+          <p:nvPr/>
+        </p:nvSpPr>
+        <p:spPr>
+          <a:xfrm>
+            <a:off x="5330447" y="4565221"/>
+            <a:ext cx="1428929" cy="380889"/>
+          </a:xfrm>
+          <a:prstGeom prst="ellipse">
+            <a:avLst/>
+          </a:prstGeom>
+        </p:spPr>
+        <p:style>
+          <a:lnRef idx="2">
+            <a:schemeClr val="accent1">
+              <a:shade val="50000"/>
+            </a:schemeClr>
+          </a:lnRef>
+          <a:fillRef idx="1">
+            <a:schemeClr val="accent1"/>
+          </a:fillRef>
+          <a:effectRef idx="0">
+            <a:schemeClr val="accent1"/>
+          </a:effectRef>
+          <a:fontRef idx="minor">
+            <a:schemeClr val="lt1"/>
+          </a:fontRef>
+        </p:style>
+        <p:txBody>
+          <a:bodyPr rtlCol="0" anchor="ctr"/>
+          <a:lstStyle/>
+          <a:p>
+            <a:pPr algn="ctr"/>
+            <a:r>
+              <a:rPr lang="en-US" dirty="0"/>
+              <a:t>handler</a:t>
+            </a:r>
+          </a:p>
+        </p:txBody>
+      </p:sp>
+      <p:sp>
+        <p:nvSpPr>
+          <p:cNvPr id="40" name="Oval 39">
+            <a:extLst>
+              <a:ext uri="{FF2B5EF4-FFF2-40B4-BE49-F238E27FC236}">
+                <a16:creationId xmlns:a16="http://schemas.microsoft.com/office/drawing/2014/main" id="{9170B2C7-FDF4-3B47-B6D1-74985F1FDCCA}"/>
+              </a:ext>
+            </a:extLst>
+          </p:cNvPr>
+          <p:cNvSpPr/>
+          <p:nvPr/>
+        </p:nvSpPr>
+        <p:spPr>
+          <a:xfrm>
+            <a:off x="5482847" y="4717621"/>
+            <a:ext cx="1428929" cy="380889"/>
+          </a:xfrm>
+          <a:prstGeom prst="ellipse">
+            <a:avLst/>
+          </a:prstGeom>
+        </p:spPr>
+        <p:style>
+          <a:lnRef idx="2">
+            <a:schemeClr val="accent1">
+              <a:shade val="50000"/>
+            </a:schemeClr>
+          </a:lnRef>
+          <a:fillRef idx="1">
+            <a:schemeClr val="accent1"/>
+          </a:fillRef>
+          <a:effectRef idx="0">
+            <a:schemeClr val="accent1"/>
+          </a:effectRef>
+          <a:fontRef idx="minor">
+            <a:schemeClr val="lt1"/>
+          </a:fontRef>
+        </p:style>
+        <p:txBody>
+          <a:bodyPr rtlCol="0" anchor="ctr"/>
+          <a:lstStyle/>
+          <a:p>
+            <a:pPr algn="ctr"/>
+            <a:r>
+              <a:rPr lang="en-US" dirty="0"/>
+              <a:t>handler</a:t>
             </a:r>
           </a:p>
         </p:txBody>
@@ -5026,7 +5073,7 @@
           <a:p>
             <a:r>
               <a:rPr lang="en-US" dirty="0"/>
-              <a:t>The DFG model tools do all of the heavy lifting so the embedded code can be extremely simple and lightweight, e.g. static typing is done in the model</a:t>
+              <a:t>The DFG model tools do all of the heavy lifting so the embedded code can be extremely simple and lightweight, e.g. type checking is done in the model</a:t>
             </a:r>
           </a:p>
           <a:p>

</xml_diff>

<commit_message>
WIP on builder and small update to slides
</commit_message>
<xml_diff>
--- a/Documents/ObjectFlow.pptx
+++ b/Documents/ObjectFlow.pptx
@@ -3164,7 +3164,15 @@
           <a:p>
             <a:r>
               <a:rPr lang="en-US" dirty="0"/>
-              <a:t>Communication is implemented at the application layer using  a set of well-known LWM2M types</a:t>
+              <a:t>Communication is </a:t>
+            </a:r>
+            <a:r>
+              <a:rPr lang="en-US"/>
+              <a:t>implemented in </a:t>
+            </a:r>
+            <a:r>
+              <a:rPr lang="en-US" dirty="0"/>
+              <a:t>the application layer using  a set of well-known LWM2M types</a:t>
             </a:r>
           </a:p>
         </p:txBody>

</xml_diff>

<commit_message>
Experiments with very simple DSL and UML visualization
</commit_message>
<xml_diff>
--- a/Documents/ObjectFlow.pptx
+++ b/Documents/ObjectFlow.pptx
@@ -6,12 +6,13 @@
   </p:sldMasterIdLst>
   <p:sldIdLst>
     <p:sldId id="256" r:id="rId2"/>
-    <p:sldId id="257" r:id="rId3"/>
-    <p:sldId id="258" r:id="rId4"/>
-    <p:sldId id="259" r:id="rId5"/>
-    <p:sldId id="262" r:id="rId6"/>
-    <p:sldId id="260" r:id="rId7"/>
-    <p:sldId id="261" r:id="rId8"/>
+    <p:sldId id="263" r:id="rId3"/>
+    <p:sldId id="257" r:id="rId4"/>
+    <p:sldId id="258" r:id="rId5"/>
+    <p:sldId id="259" r:id="rId6"/>
+    <p:sldId id="262" r:id="rId7"/>
+    <p:sldId id="260" r:id="rId8"/>
+    <p:sldId id="261" r:id="rId9"/>
   </p:sldIdLst>
   <p:sldSz cx="9144000" cy="6858000" type="letter"/>
   <p:notesSz cx="6858000" cy="9144000"/>
@@ -3077,7 +3078,7 @@
           <p:cNvPr id="2" name="Title 1">
             <a:extLst>
               <a:ext uri="{FF2B5EF4-FFF2-40B4-BE49-F238E27FC236}">
-                <a16:creationId xmlns:a16="http://schemas.microsoft.com/office/drawing/2014/main" id="{C2240561-8F38-E749-9D40-EBFE9320E741}"/>
+                <a16:creationId xmlns:a16="http://schemas.microsoft.com/office/drawing/2014/main" id="{3F8B43E4-3411-B944-9B84-649BED768D49}"/>
               </a:ext>
             </a:extLst>
           </p:cNvPr>
@@ -3088,21 +3089,15 @@
             <p:ph type="title"/>
           </p:nvPr>
         </p:nvSpPr>
-        <p:spPr>
-          <a:xfrm>
-            <a:off x="628650" y="218708"/>
-            <a:ext cx="7886700" cy="1325563"/>
-          </a:xfrm>
-        </p:spPr>
-        <p:txBody>
-          <a:bodyPr/>
-          <a:lstStyle/>
-          <a:p>
-            <a:r>
-              <a:rPr lang="en-US" dirty="0" err="1"/>
-              <a:t>ObjectFlow</a:t>
-            </a:r>
-            <a:endParaRPr lang="en-US" dirty="0"/>
+        <p:spPr/>
+        <p:txBody>
+          <a:bodyPr/>
+          <a:lstStyle/>
+          <a:p>
+            <a:r>
+              <a:rPr lang="en-US" dirty="0"/>
+              <a:t>Add</a:t>
+            </a:r>
           </a:p>
         </p:txBody>
       </p:sp>
@@ -3111,7 +3106,7 @@
           <p:cNvPr id="3" name="Content Placeholder 2">
             <a:extLst>
               <a:ext uri="{FF2B5EF4-FFF2-40B4-BE49-F238E27FC236}">
-                <a16:creationId xmlns:a16="http://schemas.microsoft.com/office/drawing/2014/main" id="{EFC3E193-0581-1D4B-AD0F-8D9BBCA916AD}"/>
+                <a16:creationId xmlns:a16="http://schemas.microsoft.com/office/drawing/2014/main" id="{06026009-F2F9-B64B-97C3-7749D95960FD}"/>
               </a:ext>
             </a:extLst>
           </p:cNvPr>
@@ -3122,65 +3117,67 @@
             <p:ph idx="1"/>
           </p:nvPr>
         </p:nvSpPr>
-        <p:spPr>
-          <a:xfrm>
-            <a:off x="628650" y="1576264"/>
-            <a:ext cx="7886700" cy="4754197"/>
-          </a:xfrm>
-        </p:spPr>
+        <p:spPr/>
         <p:txBody>
           <a:bodyPr/>
           <a:lstStyle/>
           <a:p>
             <a:r>
               <a:rPr lang="en-US" dirty="0"/>
-              <a:t>Data-driven programming for tiny microcontrollers</a:t>
+              <a:t>UML diagram for test graph</a:t>
             </a:r>
           </a:p>
           <a:p>
             <a:r>
               <a:rPr lang="en-US" dirty="0"/>
-              <a:t>Arduino Uno class (2KB/32KB) and larger</a:t>
+              <a:t>Timer function explanation – trigger example</a:t>
             </a:r>
           </a:p>
           <a:p>
             <a:r>
               <a:rPr lang="en-US" dirty="0"/>
-              <a:t>Small library, no central executive, timer- and communication event-driven</a:t>
-            </a:r>
-          </a:p>
-          <a:p>
+              <a:t>Diagram for processing flow: SDF model + </a:t>
+            </a:r>
+            <a:r>
+              <a:rPr lang="en-US" dirty="0" err="1"/>
+              <a:t>instanceGraph</a:t>
+            </a:r>
             <a:r>
               <a:rPr lang="en-US" dirty="0"/>
-              <a:t>Similar to IEC61499, Node-RED, etc. based on Data Flow Graphs (DFG)</a:t>
-            </a:r>
-          </a:p>
-          <a:p>
+              <a:t> =&gt; full </a:t>
+            </a:r>
+            <a:r>
+              <a:rPr lang="en-US" dirty="0" err="1"/>
+              <a:t>InstanceGraph</a:t>
+            </a:r>
             <a:r>
               <a:rPr lang="en-US" dirty="0"/>
-              <a:t>Uses the LWM2M data model and semantics with an event-driven communication protocol</a:t>
-            </a:r>
-          </a:p>
-          <a:p>
+              <a:t> =&gt; </a:t>
+            </a:r>
+            <a:r>
+              <a:rPr lang="en-US" dirty="0" err="1"/>
+              <a:t>codegen</a:t>
+            </a:r>
             <a:r>
               <a:rPr lang="en-US" dirty="0"/>
-              <a:t>Communication is </a:t>
-            </a:r>
-            <a:r>
-              <a:rPr lang="en-US"/>
-              <a:t>implemented in </a:t>
-            </a:r>
+              <a:t> templates</a:t>
+            </a:r>
+          </a:p>
+          <a:p>
             <a:r>
               <a:rPr lang="en-US" dirty="0"/>
-              <a:t>the application layer using  a set of well-known LWM2M types</a:t>
-            </a:r>
+              <a:t>Complex I/O object – state machine</a:t>
+            </a:r>
+          </a:p>
+          <a:p>
+            <a:endParaRPr lang="en-US" dirty="0"/>
           </a:p>
         </p:txBody>
       </p:sp>
     </p:spTree>
     <p:extLst>
       <p:ext uri="{BB962C8B-B14F-4D97-AF65-F5344CB8AC3E}">
-        <p14:creationId xmlns:p14="http://schemas.microsoft.com/office/powerpoint/2010/main" val="3287845219"/>
+        <p14:creationId xmlns:p14="http://schemas.microsoft.com/office/powerpoint/2010/main" val="3025941368"/>
       </p:ext>
     </p:extLst>
   </p:cSld>
@@ -3212,7 +3209,7 @@
           <p:cNvPr id="2" name="Title 1">
             <a:extLst>
               <a:ext uri="{FF2B5EF4-FFF2-40B4-BE49-F238E27FC236}">
-                <a16:creationId xmlns:a16="http://schemas.microsoft.com/office/drawing/2014/main" id="{53F867E8-3E7A-B542-98A7-BD954D9EBD1E}"/>
+                <a16:creationId xmlns:a16="http://schemas.microsoft.com/office/drawing/2014/main" id="{C2240561-8F38-E749-9D40-EBFE9320E741}"/>
               </a:ext>
             </a:extLst>
           </p:cNvPr>
@@ -3223,7 +3220,12 @@
             <p:ph type="title"/>
           </p:nvPr>
         </p:nvSpPr>
-        <p:spPr/>
+        <p:spPr>
+          <a:xfrm>
+            <a:off x="628650" y="218708"/>
+            <a:ext cx="7886700" cy="1325563"/>
+          </a:xfrm>
+        </p:spPr>
         <p:txBody>
           <a:bodyPr/>
           <a:lstStyle/>
@@ -3232,10 +3234,7 @@
               <a:rPr lang="en-US" dirty="0" err="1"/>
               <a:t>ObjectFlow</a:t>
             </a:r>
-            <a:r>
-              <a:rPr lang="en-US" dirty="0"/>
-              <a:t> - Digital Twin for Embedded Code</a:t>
-            </a:r>
+            <a:endParaRPr lang="en-US" dirty="0"/>
           </a:p>
         </p:txBody>
       </p:sp>
@@ -3244,7 +3243,7 @@
           <p:cNvPr id="3" name="Content Placeholder 2">
             <a:extLst>
               <a:ext uri="{FF2B5EF4-FFF2-40B4-BE49-F238E27FC236}">
-                <a16:creationId xmlns:a16="http://schemas.microsoft.com/office/drawing/2014/main" id="{1CB76708-9FC0-5048-BB77-6663E8CF3A51}"/>
+                <a16:creationId xmlns:a16="http://schemas.microsoft.com/office/drawing/2014/main" id="{EFC3E193-0581-1D4B-AD0F-8D9BBCA916AD}"/>
               </a:ext>
             </a:extLst>
           </p:cNvPr>
@@ -3257,8 +3256,8 @@
         </p:nvSpPr>
         <p:spPr>
           <a:xfrm>
-            <a:off x="519479" y="1854812"/>
-            <a:ext cx="8202490" cy="4351338"/>
+            <a:off x="628650" y="1576264"/>
+            <a:ext cx="7886700" cy="4754197"/>
           </a:xfrm>
         </p:spPr>
         <p:txBody>
@@ -3267,25 +3266,37 @@
           <a:p>
             <a:r>
               <a:rPr lang="en-US" dirty="0"/>
-              <a:t>On-device code is simple, minimal, and reliable</a:t>
+              <a:t>Data-driven programming for tiny microcontrollers</a:t>
             </a:r>
           </a:p>
           <a:p>
             <a:r>
               <a:rPr lang="en-US" dirty="0"/>
-              <a:t>A small set of primitives implemented as static C++ wrapper classes for Object and Resource </a:t>
+              <a:t>Arduino Uno class (2KB/32KB) and larger</a:t>
             </a:r>
           </a:p>
           <a:p>
             <a:r>
               <a:rPr lang="en-US" dirty="0"/>
-              <a:t>Graphs are build from a standardized JSON format that models  Object and Resource Instances on the embedded device – a digital twin of the device code</a:t>
+              <a:t>Small library, no central executive, timer- and communication event-driven</a:t>
             </a:r>
           </a:p>
           <a:p>
             <a:r>
               <a:rPr lang="en-US" dirty="0"/>
-              <a:t>Tools construct a C++ header file template that is built with the device code application handler bundle using the standard IDE (e.g. Arduino IDE), and downloaded to the device in the usual way.</a:t>
+              <a:t>Similar to IEC61499, Node-RED, etc. based on Data Flow Graphs (DFG)</a:t>
+            </a:r>
+          </a:p>
+          <a:p>
+            <a:r>
+              <a:rPr lang="en-US" dirty="0"/>
+              <a:t>Uses the LWM2M data model and semantics with an event-driven communication protocol</a:t>
+            </a:r>
+          </a:p>
+          <a:p>
+            <a:r>
+              <a:rPr lang="en-US" dirty="0"/>
+              <a:t>Communication is implemented in the application layer using  a set of well-known LWM2M types</a:t>
             </a:r>
           </a:p>
         </p:txBody>
@@ -3293,7 +3304,7 @@
     </p:spTree>
     <p:extLst>
       <p:ext uri="{BB962C8B-B14F-4D97-AF65-F5344CB8AC3E}">
-        <p14:creationId xmlns:p14="http://schemas.microsoft.com/office/powerpoint/2010/main" val="898881681"/>
+        <p14:creationId xmlns:p14="http://schemas.microsoft.com/office/powerpoint/2010/main" val="3287845219"/>
       </p:ext>
     </p:extLst>
   </p:cSld>
@@ -3347,6 +3358,119 @@
             </a:r>
             <a:r>
               <a:rPr lang="en-US" dirty="0"/>
+              <a:t> - Digital Twin for Embedded Code</a:t>
+            </a:r>
+          </a:p>
+        </p:txBody>
+      </p:sp>
+      <p:sp>
+        <p:nvSpPr>
+          <p:cNvPr id="3" name="Content Placeholder 2">
+            <a:extLst>
+              <a:ext uri="{FF2B5EF4-FFF2-40B4-BE49-F238E27FC236}">
+                <a16:creationId xmlns:a16="http://schemas.microsoft.com/office/drawing/2014/main" id="{1CB76708-9FC0-5048-BB77-6663E8CF3A51}"/>
+              </a:ext>
+            </a:extLst>
+          </p:cNvPr>
+          <p:cNvSpPr>
+            <a:spLocks noGrp="1"/>
+          </p:cNvSpPr>
+          <p:nvPr>
+            <p:ph idx="1"/>
+          </p:nvPr>
+        </p:nvSpPr>
+        <p:spPr>
+          <a:xfrm>
+            <a:off x="519479" y="1854812"/>
+            <a:ext cx="8202490" cy="4351338"/>
+          </a:xfrm>
+        </p:spPr>
+        <p:txBody>
+          <a:bodyPr/>
+          <a:lstStyle/>
+          <a:p>
+            <a:r>
+              <a:rPr lang="en-US" dirty="0"/>
+              <a:t>On-device code is simple, minimal, and reliable</a:t>
+            </a:r>
+          </a:p>
+          <a:p>
+            <a:r>
+              <a:rPr lang="en-US" dirty="0"/>
+              <a:t>A small set of primitives implemented as static C++ wrapper classes for Object and Resource </a:t>
+            </a:r>
+          </a:p>
+          <a:p>
+            <a:r>
+              <a:rPr lang="en-US" dirty="0"/>
+              <a:t>Graphs are build from a standardized JSON format that models  Object and Resource Instances on the embedded device – a digital twin of the device code</a:t>
+            </a:r>
+          </a:p>
+          <a:p>
+            <a:r>
+              <a:rPr lang="en-US" dirty="0"/>
+              <a:t>Tools construct a C++ header file template that is built with the device code application handler bundle using the standard IDE (e.g. Arduino IDE), and downloaded to the device in the usual way.</a:t>
+            </a:r>
+          </a:p>
+        </p:txBody>
+      </p:sp>
+    </p:spTree>
+    <p:extLst>
+      <p:ext uri="{BB962C8B-B14F-4D97-AF65-F5344CB8AC3E}">
+        <p14:creationId xmlns:p14="http://schemas.microsoft.com/office/powerpoint/2010/main" val="898881681"/>
+      </p:ext>
+    </p:extLst>
+  </p:cSld>
+  <p:clrMapOvr>
+    <a:masterClrMapping/>
+  </p:clrMapOvr>
+</p:sld>
+</file>
+
+<file path=ppt/slides/slide5.xml><?xml version="1.0" encoding="utf-8"?>
+<p:sld xmlns:a="http://schemas.openxmlformats.org/drawingml/2006/main" xmlns:r="http://schemas.openxmlformats.org/officeDocument/2006/relationships" xmlns:p="http://schemas.openxmlformats.org/presentationml/2006/main">
+  <p:cSld>
+    <p:spTree>
+      <p:nvGrpSpPr>
+        <p:cNvPr id="1" name=""/>
+        <p:cNvGrpSpPr/>
+        <p:nvPr/>
+      </p:nvGrpSpPr>
+      <p:grpSpPr>
+        <a:xfrm>
+          <a:off x="0" y="0"/>
+          <a:ext cx="0" cy="0"/>
+          <a:chOff x="0" y="0"/>
+          <a:chExt cx="0" cy="0"/>
+        </a:xfrm>
+      </p:grpSpPr>
+      <p:sp>
+        <p:nvSpPr>
+          <p:cNvPr id="2" name="Title 1">
+            <a:extLst>
+              <a:ext uri="{FF2B5EF4-FFF2-40B4-BE49-F238E27FC236}">
+                <a16:creationId xmlns:a16="http://schemas.microsoft.com/office/drawing/2014/main" id="{53F867E8-3E7A-B542-98A7-BD954D9EBD1E}"/>
+              </a:ext>
+            </a:extLst>
+          </p:cNvPr>
+          <p:cNvSpPr>
+            <a:spLocks noGrp="1"/>
+          </p:cNvSpPr>
+          <p:nvPr>
+            <p:ph type="title"/>
+          </p:nvPr>
+        </p:nvSpPr>
+        <p:spPr/>
+        <p:txBody>
+          <a:bodyPr/>
+          <a:lstStyle/>
+          <a:p>
+            <a:r>
+              <a:rPr lang="en-US" dirty="0" err="1"/>
+              <a:t>ObjectFlow</a:t>
+            </a:r>
+            <a:r>
+              <a:rPr lang="en-US" dirty="0"/>
               <a:t> – DFG wrapper</a:t>
             </a:r>
           </a:p>
@@ -3496,7 +3620,7 @@
 </p:sld>
 </file>
 
-<file path=ppt/slides/slide5.xml><?xml version="1.0" encoding="utf-8"?>
+<file path=ppt/slides/slide6.xml><?xml version="1.0" encoding="utf-8"?>
 <p:sld xmlns:a="http://schemas.openxmlformats.org/drawingml/2006/main" xmlns:r="http://schemas.openxmlformats.org/officeDocument/2006/relationships" xmlns:p="http://schemas.openxmlformats.org/presentationml/2006/main">
   <p:cSld>
     <p:spTree>
@@ -4877,7 +5001,7 @@
 </p:sld>
 </file>
 
-<file path=ppt/slides/slide6.xml><?xml version="1.0" encoding="utf-8"?>
+<file path=ppt/slides/slide7.xml><?xml version="1.0" encoding="utf-8"?>
 <p:sld xmlns:a="http://schemas.openxmlformats.org/drawingml/2006/main" xmlns:r="http://schemas.openxmlformats.org/officeDocument/2006/relationships" xmlns:p="http://schemas.openxmlformats.org/presentationml/2006/main">
   <p:cSld>
     <p:spTree>
@@ -5009,7 +5133,7 @@
 </p:sld>
 </file>
 
-<file path=ppt/slides/slide7.xml><?xml version="1.0" encoding="utf-8"?>
+<file path=ppt/slides/slide8.xml><?xml version="1.0" encoding="utf-8"?>
 <p:sld xmlns:a="http://schemas.openxmlformats.org/drawingml/2006/main" xmlns:r="http://schemas.openxmlformats.org/officeDocument/2006/relationships" xmlns:p="http://schemas.openxmlformats.org/presentationml/2006/main">
   <p:cSld>
     <p:spTree>

</xml_diff>

<commit_message>
Update slides and some cleanup
Update slides and some cleanup
</commit_message>
<xml_diff>
--- a/Documents/ObjectFlow.pptx
+++ b/Documents/ObjectFlow.pptx
@@ -4661,7 +4661,7 @@
         </p:nvSpPr>
         <p:spPr>
           <a:xfrm>
-            <a:off x="1985922" y="1234706"/>
+            <a:off x="1949982" y="1408902"/>
             <a:ext cx="901700" cy="369332"/>
           </a:xfrm>
           <a:prstGeom prst="rect">
@@ -5398,6 +5398,185 @@
             <a:r>
               <a:rPr lang="en-US" dirty="0"/>
               <a:t>Render</a:t>
+            </a:r>
+          </a:p>
+        </p:txBody>
+      </p:sp>
+      <p:sp>
+        <p:nvSpPr>
+          <p:cNvPr id="36" name="Card 35">
+            <a:extLst>
+              <a:ext uri="{FF2B5EF4-FFF2-40B4-BE49-F238E27FC236}">
+                <a16:creationId xmlns:a16="http://schemas.microsoft.com/office/drawing/2014/main" id="{333AD47B-0695-A747-B0C2-EC52F98BB599}"/>
+              </a:ext>
+            </a:extLst>
+          </p:cNvPr>
+          <p:cNvSpPr/>
+          <p:nvPr/>
+        </p:nvSpPr>
+        <p:spPr>
+          <a:xfrm>
+            <a:off x="5382088" y="5048871"/>
+            <a:ext cx="901700" cy="1066800"/>
+          </a:xfrm>
+          <a:prstGeom prst="flowChartPunchedCard">
+            <a:avLst/>
+          </a:prstGeom>
+          <a:solidFill>
+            <a:schemeClr val="bg1"/>
+          </a:solidFill>
+          <a:ln w="19050">
+            <a:solidFill>
+              <a:schemeClr val="tx1"/>
+            </a:solidFill>
+          </a:ln>
+        </p:spPr>
+        <p:style>
+          <a:lnRef idx="2">
+            <a:schemeClr val="accent1">
+              <a:shade val="50000"/>
+            </a:schemeClr>
+          </a:lnRef>
+          <a:fillRef idx="1">
+            <a:schemeClr val="accent1"/>
+          </a:fillRef>
+          <a:effectRef idx="0">
+            <a:schemeClr val="accent1"/>
+          </a:effectRef>
+          <a:fontRef idx="minor">
+            <a:schemeClr val="lt1"/>
+          </a:fontRef>
+        </p:style>
+        <p:txBody>
+          <a:bodyPr rtlCol="0" anchor="ctr"/>
+          <a:lstStyle/>
+          <a:p>
+            <a:pPr algn="ctr"/>
+            <a:r>
+              <a:rPr lang="en-US" dirty="0">
+                <a:solidFill>
+                  <a:schemeClr val="tx1"/>
+                </a:solidFill>
+              </a:rPr>
+              <a:t>Flow UML</a:t>
+            </a:r>
+          </a:p>
+        </p:txBody>
+      </p:sp>
+      <p:sp>
+        <p:nvSpPr>
+          <p:cNvPr id="37" name="Right Arrow 36">
+            <a:extLst>
+              <a:ext uri="{FF2B5EF4-FFF2-40B4-BE49-F238E27FC236}">
+                <a16:creationId xmlns:a16="http://schemas.microsoft.com/office/drawing/2014/main" id="{00CCA828-A119-E140-BC6D-5E9B3366CB44}"/>
+              </a:ext>
+            </a:extLst>
+          </p:cNvPr>
+          <p:cNvSpPr/>
+          <p:nvPr/>
+        </p:nvSpPr>
+        <p:spPr>
+          <a:xfrm>
+            <a:off x="4005552" y="5302533"/>
+            <a:ext cx="1190622" cy="357545"/>
+          </a:xfrm>
+          <a:prstGeom prst="rightArrow">
+            <a:avLst/>
+          </a:prstGeom>
+        </p:spPr>
+        <p:style>
+          <a:lnRef idx="2">
+            <a:schemeClr val="accent1">
+              <a:shade val="50000"/>
+            </a:schemeClr>
+          </a:lnRef>
+          <a:fillRef idx="1">
+            <a:schemeClr val="accent1"/>
+          </a:fillRef>
+          <a:effectRef idx="0">
+            <a:schemeClr val="accent1"/>
+          </a:effectRef>
+          <a:fontRef idx="minor">
+            <a:schemeClr val="lt1"/>
+          </a:fontRef>
+        </p:style>
+        <p:txBody>
+          <a:bodyPr rtlCol="0" anchor="ctr"/>
+          <a:lstStyle/>
+          <a:p>
+            <a:pPr algn="ctr"/>
+            <a:endParaRPr lang="en-US"/>
+          </a:p>
+        </p:txBody>
+      </p:sp>
+      <p:sp>
+        <p:nvSpPr>
+          <p:cNvPr id="41" name="TextBox 40">
+            <a:extLst>
+              <a:ext uri="{FF2B5EF4-FFF2-40B4-BE49-F238E27FC236}">
+                <a16:creationId xmlns:a16="http://schemas.microsoft.com/office/drawing/2014/main" id="{3BC3F445-3455-1240-8091-1D0BE7DE953D}"/>
+              </a:ext>
+            </a:extLst>
+          </p:cNvPr>
+          <p:cNvSpPr txBox="1"/>
+          <p:nvPr/>
+        </p:nvSpPr>
+        <p:spPr>
+          <a:xfrm>
+            <a:off x="3923907" y="5023084"/>
+            <a:ext cx="1289049" cy="369332"/>
+          </a:xfrm>
+          <a:prstGeom prst="rect">
+            <a:avLst/>
+          </a:prstGeom>
+          <a:noFill/>
+        </p:spPr>
+        <p:txBody>
+          <a:bodyPr wrap="square" rtlCol="0">
+            <a:spAutoFit/>
+          </a:bodyPr>
+          <a:lstStyle/>
+          <a:p>
+            <a:pPr algn="ctr"/>
+            <a:r>
+              <a:rPr lang="en-US" dirty="0"/>
+              <a:t>Render</a:t>
+            </a:r>
+          </a:p>
+        </p:txBody>
+      </p:sp>
+      <p:sp>
+        <p:nvSpPr>
+          <p:cNvPr id="49" name="TextBox 48">
+            <a:extLst>
+              <a:ext uri="{FF2B5EF4-FFF2-40B4-BE49-F238E27FC236}">
+                <a16:creationId xmlns:a16="http://schemas.microsoft.com/office/drawing/2014/main" id="{77C91406-1E6B-3645-ADDE-7F1B7278E939}"/>
+              </a:ext>
+            </a:extLst>
+          </p:cNvPr>
+          <p:cNvSpPr txBox="1"/>
+          <p:nvPr/>
+        </p:nvSpPr>
+        <p:spPr>
+          <a:xfrm>
+            <a:off x="6283788" y="5296662"/>
+            <a:ext cx="1289049" cy="369332"/>
+          </a:xfrm>
+          <a:prstGeom prst="rect">
+            <a:avLst/>
+          </a:prstGeom>
+          <a:noFill/>
+        </p:spPr>
+        <p:txBody>
+          <a:bodyPr wrap="square" rtlCol="0">
+            <a:spAutoFit/>
+          </a:bodyPr>
+          <a:lstStyle/>
+          <a:p>
+            <a:pPr algn="ctr"/>
+            <a:r>
+              <a:rPr lang="en-US" dirty="0"/>
+              <a:t>Documents</a:t>
             </a:r>
           </a:p>
         </p:txBody>
@@ -5672,7 +5851,7 @@
         </p:nvSpPr>
         <p:spPr>
           <a:xfrm>
-            <a:off x="5473700" y="2224089"/>
+            <a:off x="5473700" y="2134881"/>
             <a:ext cx="901700" cy="1066800"/>
           </a:xfrm>
           <a:prstGeom prst="flowChartPunchedCard">
@@ -5808,6 +5987,67 @@
             <a:r>
               <a:rPr lang="en-US" dirty="0"/>
               <a:t>Target</a:t>
+            </a:r>
+          </a:p>
+        </p:txBody>
+      </p:sp>
+      <p:sp>
+        <p:nvSpPr>
+          <p:cNvPr id="10" name="Card 9">
+            <a:extLst>
+              <a:ext uri="{FF2B5EF4-FFF2-40B4-BE49-F238E27FC236}">
+                <a16:creationId xmlns:a16="http://schemas.microsoft.com/office/drawing/2014/main" id="{6B9A202E-5A3C-424C-A240-4281EE71CC51}"/>
+              </a:ext>
+            </a:extLst>
+          </p:cNvPr>
+          <p:cNvSpPr/>
+          <p:nvPr/>
+        </p:nvSpPr>
+        <p:spPr>
+          <a:xfrm>
+            <a:off x="5626100" y="2287281"/>
+            <a:ext cx="901700" cy="1066800"/>
+          </a:xfrm>
+          <a:prstGeom prst="flowChartPunchedCard">
+            <a:avLst/>
+          </a:prstGeom>
+          <a:solidFill>
+            <a:schemeClr val="bg1"/>
+          </a:solidFill>
+          <a:ln w="19050">
+            <a:solidFill>
+              <a:schemeClr val="tx1"/>
+            </a:solidFill>
+          </a:ln>
+        </p:spPr>
+        <p:style>
+          <a:lnRef idx="2">
+            <a:schemeClr val="accent1">
+              <a:shade val="50000"/>
+            </a:schemeClr>
+          </a:lnRef>
+          <a:fillRef idx="1">
+            <a:schemeClr val="accent1"/>
+          </a:fillRef>
+          <a:effectRef idx="0">
+            <a:schemeClr val="accent1"/>
+          </a:effectRef>
+          <a:fontRef idx="minor">
+            <a:schemeClr val="lt1"/>
+          </a:fontRef>
+        </p:style>
+        <p:txBody>
+          <a:bodyPr rtlCol="0" anchor="ctr"/>
+          <a:lstStyle/>
+          <a:p>
+            <a:pPr algn="ctr"/>
+            <a:r>
+              <a:rPr lang="en-US" dirty="0">
+                <a:solidFill>
+                  <a:schemeClr val="tx1"/>
+                </a:solidFill>
+              </a:rPr>
+              <a:t>UML Doc</a:t>
             </a:r>
           </a:p>
         </p:txBody>
@@ -11253,8 +11493,8 @@
         </p:nvSpPr>
         <p:spPr>
           <a:xfrm>
-            <a:off x="450850" y="909003"/>
-            <a:ext cx="6356350" cy="2554545"/>
+            <a:off x="406246" y="909003"/>
+            <a:ext cx="6356350" cy="2800767"/>
           </a:xfrm>
           <a:prstGeom prst="rect">
             <a:avLst/>
@@ -11343,6 +11583,53 @@
                 </a:solidFill>
                 <a:latin typeface="Courier" pitchFamily="2" charset="0"/>
               </a:rPr>
+              <a:t>ValueType</a:t>
+            </a:r>
+            <a:r>
+              <a:rPr lang="en-US" sz="1600" dirty="0">
+                <a:solidFill>
+                  <a:srgbClr val="000000"/>
+                </a:solidFill>
+                <a:latin typeface="Courier" pitchFamily="2" charset="0"/>
+              </a:rPr>
+              <a:t>: { </a:t>
+            </a:r>
+            <a:r>
+              <a:rPr lang="en-US" sz="1600" dirty="0" err="1">
+                <a:solidFill>
+                  <a:srgbClr val="000000"/>
+                </a:solidFill>
+                <a:latin typeface="Courier" pitchFamily="2" charset="0"/>
+              </a:rPr>
+              <a:t>const</a:t>
+            </a:r>
+            <a:r>
+              <a:rPr lang="en-US" sz="1600" dirty="0">
+                <a:solidFill>
+                  <a:srgbClr val="000000"/>
+                </a:solidFill>
+                <a:latin typeface="Courier" pitchFamily="2" charset="0"/>
+              </a:rPr>
+              <a:t>: 27000 }</a:t>
+            </a:r>
+          </a:p>
+          <a:p>
+            <a:r>
+              <a:rPr lang="en-US" sz="1600" dirty="0">
+                <a:solidFill>
+                  <a:srgbClr val="000000"/>
+                </a:solidFill>
+                <a:latin typeface="Courier" pitchFamily="2" charset="0"/>
+              </a:rPr>
+              <a:t>    </a:t>
+            </a:r>
+            <a:r>
+              <a:rPr lang="en-US" sz="1600" dirty="0" err="1">
+                <a:solidFill>
+                  <a:srgbClr val="000000"/>
+                </a:solidFill>
+                <a:latin typeface="Courier" pitchFamily="2" charset="0"/>
+              </a:rPr>
               <a:t>InputLinkType</a:t>
             </a:r>
             <a:r>
@@ -11370,7 +11657,7 @@
                 </a:solidFill>
                 <a:latin typeface="Courier" pitchFamily="2" charset="0"/>
               </a:rPr>
-              <a:t>: 27000 }</a:t>
+              <a:t>: 27001 }</a:t>
             </a:r>
             <a:br>
               <a:rPr lang="en-US" sz="1600" dirty="0">
@@ -11423,7 +11710,7 @@
                 </a:solidFill>
                 <a:latin typeface="Courier" pitchFamily="2" charset="0"/>
               </a:rPr>
-              <a:t>: 27001 }</a:t>
+              <a:t>: 27002 }</a:t>
             </a:r>
             <a:br>
               <a:rPr lang="en-US" sz="1600" dirty="0">
@@ -11476,7 +11763,7 @@
                 </a:solidFill>
                 <a:latin typeface="Courier" pitchFamily="2" charset="0"/>
               </a:rPr>
-              <a:t>: 27002 }</a:t>
+              <a:t>: 27003 }</a:t>
             </a:r>
             <a:br>
               <a:rPr lang="en-US" sz="1600" dirty="0">
@@ -11529,7 +11816,7 @@
                 </a:solidFill>
                 <a:latin typeface="Courier" pitchFamily="2" charset="0"/>
               </a:rPr>
-              <a:t>: 27003 }</a:t>
+              <a:t>: 27004 }</a:t>
             </a:r>
             <a:br>
               <a:rPr lang="en-US" sz="1600" dirty="0">
@@ -11582,7 +11869,7 @@
                 </a:solidFill>
                 <a:latin typeface="Courier" pitchFamily="2" charset="0"/>
               </a:rPr>
-              <a:t>: 27004 }</a:t>
+              <a:t>: 27005 }</a:t>
             </a:r>
             <a:br>
               <a:rPr lang="en-US" sz="1600" dirty="0">
@@ -11635,7 +11922,7 @@
                 </a:solidFill>
                 <a:latin typeface="Courier" pitchFamily="2" charset="0"/>
               </a:rPr>
-              <a:t>: 27005 }</a:t>
+              <a:t>: 27006 }</a:t>
             </a:r>
             <a:br>
               <a:rPr lang="en-US" sz="1600" dirty="0">
@@ -11688,7 +11975,7 @@
                 </a:solidFill>
                 <a:latin typeface="Courier" pitchFamily="2" charset="0"/>
               </a:rPr>
-              <a:t>: 27006 }</a:t>
+              <a:t>: 27007 }</a:t>
             </a:r>
             <a:br>
               <a:rPr lang="en-US" sz="1600" dirty="0">
@@ -11741,7 +12028,7 @@
                 </a:solidFill>
                 <a:latin typeface="Courier" pitchFamily="2" charset="0"/>
               </a:rPr>
-              <a:t>: 27007 }</a:t>
+              <a:t>: 27008 }</a:t>
             </a:r>
             <a:endParaRPr lang="en-US" sz="1600" dirty="0"/>
           </a:p>
@@ -11761,8 +12048,8 @@
         </p:nvSpPr>
         <p:spPr>
           <a:xfrm>
-            <a:off x="3822700" y="4082177"/>
-            <a:ext cx="4692650" cy="2062103"/>
+            <a:off x="3822700" y="4037573"/>
+            <a:ext cx="4692650" cy="2308324"/>
           </a:xfrm>
           <a:prstGeom prst="rect">
             <a:avLst/>
@@ -11801,6 +12088,35 @@
               </a:rPr>
               <a:t> 27000</a:t>
             </a:r>
+          </a:p>
+          <a:p>
+            <a:r>
+              <a:rPr lang="en-US" sz="1600" dirty="0">
+                <a:solidFill>
+                  <a:srgbClr val="000000"/>
+                </a:solidFill>
+                <a:latin typeface="Courier" pitchFamily="2" charset="0"/>
+              </a:rPr>
+              <a:t>#define </a:t>
+            </a:r>
+            <a:r>
+              <a:rPr lang="en-US" sz="1600" dirty="0" err="1">
+                <a:solidFill>
+                  <a:srgbClr val="000000"/>
+                </a:solidFill>
+                <a:latin typeface="Courier" pitchFamily="2" charset="0"/>
+              </a:rPr>
+              <a:t>InputLinkType</a:t>
+            </a:r>
+            <a:r>
+              <a:rPr lang="en-US" sz="1600" dirty="0">
+                <a:solidFill>
+                  <a:srgbClr val="000000"/>
+                </a:solidFill>
+                <a:latin typeface="Courier" pitchFamily="2" charset="0"/>
+              </a:rPr>
+              <a:t> 27001</a:t>
+            </a:r>
             <a:br>
               <a:rPr lang="en-US" sz="1600" dirty="0"/>
             </a:br>
@@ -11829,7 +12145,7 @@
                 </a:solidFill>
                 <a:latin typeface="Courier" pitchFamily="2" charset="0"/>
               </a:rPr>
-              <a:t> 27001</a:t>
+              <a:t> 27002</a:t>
             </a:r>
             <a:br>
               <a:rPr lang="en-US" sz="1600" dirty="0"/>
@@ -11859,7 +12175,7 @@
                 </a:solidFill>
                 <a:latin typeface="Courier" pitchFamily="2" charset="0"/>
               </a:rPr>
-              <a:t> 27002</a:t>
+              <a:t> 27003</a:t>
             </a:r>
             <a:br>
               <a:rPr lang="en-US" sz="1600" dirty="0"/>
@@ -11889,7 +12205,7 @@
                 </a:solidFill>
                 <a:latin typeface="Courier" pitchFamily="2" charset="0"/>
               </a:rPr>
-              <a:t> 27003</a:t>
+              <a:t> 27004</a:t>
             </a:r>
             <a:br>
               <a:rPr lang="en-US" sz="1600" dirty="0"/>
@@ -11919,7 +12235,7 @@
                 </a:solidFill>
                 <a:latin typeface="Courier" pitchFamily="2" charset="0"/>
               </a:rPr>
-              <a:t> 27004</a:t>
+              <a:t> 27005</a:t>
             </a:r>
             <a:br>
               <a:rPr lang="en-US" sz="1600" dirty="0"/>
@@ -11949,7 +12265,7 @@
                 </a:solidFill>
                 <a:latin typeface="Courier" pitchFamily="2" charset="0"/>
               </a:rPr>
-              <a:t> 27005</a:t>
+              <a:t> 27006</a:t>
             </a:r>
             <a:br>
               <a:rPr lang="en-US" sz="1600" dirty="0"/>
@@ -11979,7 +12295,7 @@
                 </a:solidFill>
                 <a:latin typeface="Courier" pitchFamily="2" charset="0"/>
               </a:rPr>
-              <a:t> 27006</a:t>
+              <a:t> 27007</a:t>
             </a:r>
             <a:br>
               <a:rPr lang="en-US" sz="1600" dirty="0"/>
@@ -12009,7 +12325,7 @@
                 </a:solidFill>
                 <a:latin typeface="Courier" pitchFamily="2" charset="0"/>
               </a:rPr>
-              <a:t> 27007</a:t>
+              <a:t> 27008</a:t>
             </a:r>
             <a:endParaRPr lang="en-US" sz="1600" dirty="0"/>
           </a:p>
@@ -12029,8 +12345,8 @@
         </p:nvSpPr>
         <p:spPr>
           <a:xfrm>
-            <a:off x="6617992" y="2132945"/>
-            <a:ext cx="1960858" cy="523220"/>
+            <a:off x="6554492" y="2301472"/>
+            <a:ext cx="2255810" cy="523220"/>
           </a:xfrm>
           <a:prstGeom prst="rect">
             <a:avLst/>
@@ -12045,7 +12361,7 @@
           <a:p>
             <a:r>
               <a:rPr lang="en-US" sz="2800" dirty="0"/>
-              <a:t>SDF Defined</a:t>
+              <a:t>SDF Definition</a:t>
             </a:r>
           </a:p>
         </p:txBody>
@@ -12064,7 +12380,7 @@
         </p:nvSpPr>
         <p:spPr>
           <a:xfrm>
-            <a:off x="5880100" y="1325562"/>
+            <a:off x="5888230" y="1515579"/>
             <a:ext cx="673100" cy="2137986"/>
           </a:xfrm>
           <a:prstGeom prst="rightBrace">
@@ -12114,7 +12430,7 @@
         <p:spPr>
           <a:xfrm rot="10800000">
             <a:off x="3073400" y="4082175"/>
-            <a:ext cx="673100" cy="2062104"/>
+            <a:ext cx="673100" cy="2162508"/>
           </a:xfrm>
           <a:prstGeom prst="rightBrace">
             <a:avLst/>
@@ -13076,7 +13392,7 @@
             <a:pPr lvl="1"/>
             <a:r>
               <a:rPr lang="en-US" dirty="0"/>
-              <a:t>Subtypes for Input, Output, and Current Value</a:t>
+              <a:t>Value subtypes for Input, Output, and Current Value</a:t>
             </a:r>
           </a:p>
           <a:p>
@@ -14587,7 +14903,7 @@
           <a:p>
             <a:r>
               <a:rPr lang="en-US" dirty="0"/>
-              <a:t>Complex Function Objects</a:t>
+              <a:t>Complex Functions </a:t>
             </a:r>
           </a:p>
         </p:txBody>
@@ -14658,7 +14974,7 @@
         </p:nvSpPr>
         <p:spPr>
           <a:xfrm>
-            <a:off x="1333500" y="2383230"/>
+            <a:off x="1333500" y="3008304"/>
             <a:ext cx="1041400" cy="990600"/>
           </a:xfrm>
           <a:prstGeom prst="rect">
@@ -14710,7 +15026,7 @@
         </p:nvSpPr>
         <p:spPr>
           <a:xfrm>
-            <a:off x="1333500" y="2862652"/>
+            <a:off x="1333500" y="3487726"/>
             <a:ext cx="1041400" cy="255589"/>
           </a:xfrm>
           <a:prstGeom prst="rect">
@@ -15005,7 +15321,7 @@
         </p:nvSpPr>
         <p:spPr>
           <a:xfrm>
-            <a:off x="1333500" y="3914765"/>
+            <a:off x="1333500" y="4296559"/>
             <a:ext cx="1041400" cy="990600"/>
           </a:xfrm>
           <a:prstGeom prst="rect">
@@ -15057,7 +15373,7 @@
         </p:nvSpPr>
         <p:spPr>
           <a:xfrm>
-            <a:off x="1333500" y="4394187"/>
+            <a:off x="1333500" y="4775981"/>
             <a:ext cx="1041400" cy="255589"/>
           </a:xfrm>
           <a:prstGeom prst="rect">
@@ -15347,9 +15663,9 @@
           <p:nvPr/>
         </p:nvCxnSpPr>
         <p:spPr>
-          <a:xfrm>
-            <a:off x="2374900" y="2990447"/>
-            <a:ext cx="1270000" cy="219475"/>
+          <a:xfrm flipV="1">
+            <a:off x="2374900" y="3209922"/>
+            <a:ext cx="1270000" cy="405599"/>
           </a:xfrm>
           <a:prstGeom prst="straightConnector1">
             <a:avLst/>
@@ -15396,7 +15712,7 @@
         <p:spPr>
           <a:xfrm flipV="1">
             <a:off x="2374900" y="3933027"/>
-            <a:ext cx="1270000" cy="588955"/>
+            <a:ext cx="1270000" cy="970749"/>
           </a:xfrm>
           <a:prstGeom prst="straightConnector1">
             <a:avLst/>
@@ -15544,7 +15860,7 @@
         </p:nvSpPr>
         <p:spPr>
           <a:xfrm>
-            <a:off x="1131085" y="1887296"/>
+            <a:off x="1131085" y="2554807"/>
             <a:ext cx="1446230" cy="369332"/>
           </a:xfrm>
           <a:prstGeom prst="rect">
@@ -15557,6 +15873,7 @@
           </a:bodyPr>
           <a:lstStyle/>
           <a:p>
+            <a:pPr algn="ctr"/>
             <a:r>
               <a:rPr lang="en-US" dirty="0"/>
               <a:t>Input Objects</a:t>
@@ -15578,7 +15895,7 @@
         </p:nvSpPr>
         <p:spPr>
           <a:xfrm>
-            <a:off x="6426985" y="3470550"/>
+            <a:off x="6285921" y="3482442"/>
             <a:ext cx="1617751" cy="369332"/>
           </a:xfrm>
           <a:prstGeom prst="rect">
@@ -15591,6 +15908,7 @@
           </a:bodyPr>
           <a:lstStyle/>
           <a:p>
+            <a:pPr algn="ctr"/>
             <a:r>
               <a:rPr lang="en-US" dirty="0"/>
               <a:t>Output Objects</a:t>
@@ -15625,6 +15943,7 @@
           </a:bodyPr>
           <a:lstStyle/>
           <a:p>
+            <a:pPr algn="ctr"/>
             <a:r>
               <a:rPr lang="en-US" dirty="0"/>
               <a:t>Function Object</a:t>
@@ -15632,6 +15951,228 @@
           </a:p>
         </p:txBody>
       </p:sp>
+      <p:cxnSp>
+        <p:nvCxnSpPr>
+          <p:cNvPr id="23" name="Straight Arrow Connector 22">
+            <a:extLst>
+              <a:ext uri="{FF2B5EF4-FFF2-40B4-BE49-F238E27FC236}">
+                <a16:creationId xmlns:a16="http://schemas.microsoft.com/office/drawing/2014/main" id="{09AACC59-6F92-7E46-A493-4AE7197E31AF}"/>
+              </a:ext>
+            </a:extLst>
+          </p:cNvPr>
+          <p:cNvCxnSpPr>
+            <a:cxnSpLocks/>
+            <a:stCxn id="26" idx="3"/>
+            <a:endCxn id="33" idx="1"/>
+          </p:cNvCxnSpPr>
+          <p:nvPr/>
+        </p:nvCxnSpPr>
+        <p:spPr>
+          <a:xfrm>
+            <a:off x="2718379" y="2214963"/>
+            <a:ext cx="926521" cy="205561"/>
+          </a:xfrm>
+          <a:prstGeom prst="straightConnector1">
+            <a:avLst/>
+          </a:prstGeom>
+          <a:ln w="25400">
+            <a:solidFill>
+              <a:schemeClr val="tx1"/>
+            </a:solidFill>
+            <a:headEnd type="none"/>
+            <a:tailEnd type="triangle" w="lg" len="lg"/>
+          </a:ln>
+        </p:spPr>
+        <p:style>
+          <a:lnRef idx="1">
+            <a:schemeClr val="accent1"/>
+          </a:lnRef>
+          <a:fillRef idx="0">
+            <a:schemeClr val="accent1"/>
+          </a:fillRef>
+          <a:effectRef idx="0">
+            <a:schemeClr val="accent1"/>
+          </a:effectRef>
+          <a:fontRef idx="minor">
+            <a:schemeClr val="tx1"/>
+          </a:fontRef>
+        </p:style>
+      </p:cxnSp>
+      <p:sp>
+        <p:nvSpPr>
+          <p:cNvPr id="26" name="Rectangle 25">
+            <a:extLst>
+              <a:ext uri="{FF2B5EF4-FFF2-40B4-BE49-F238E27FC236}">
+                <a16:creationId xmlns:a16="http://schemas.microsoft.com/office/drawing/2014/main" id="{B4D26200-5611-8F48-A509-76E8F1E4AC44}"/>
+              </a:ext>
+            </a:extLst>
+          </p:cNvPr>
+          <p:cNvSpPr/>
+          <p:nvPr/>
+        </p:nvSpPr>
+        <p:spPr>
+          <a:xfrm>
+            <a:off x="1747921" y="2030297"/>
+            <a:ext cx="970458" cy="369332"/>
+          </a:xfrm>
+          <a:prstGeom prst="rect">
+            <a:avLst/>
+          </a:prstGeom>
+        </p:spPr>
+        <p:txBody>
+          <a:bodyPr wrap="none">
+            <a:spAutoFit/>
+          </a:bodyPr>
+          <a:lstStyle/>
+          <a:p>
+            <a:r>
+              <a:rPr lang="en-US" dirty="0"/>
+              <a:t>(Trigger)</a:t>
+            </a:r>
+          </a:p>
+        </p:txBody>
+      </p:sp>
+      <p:cxnSp>
+        <p:nvCxnSpPr>
+          <p:cNvPr id="37" name="Straight Arrow Connector 36">
+            <a:extLst>
+              <a:ext uri="{FF2B5EF4-FFF2-40B4-BE49-F238E27FC236}">
+                <a16:creationId xmlns:a16="http://schemas.microsoft.com/office/drawing/2014/main" id="{ED5A02E4-6F26-5A4B-B86A-78AADB5A903F}"/>
+              </a:ext>
+            </a:extLst>
+          </p:cNvPr>
+          <p:cNvCxnSpPr>
+            <a:cxnSpLocks/>
+            <a:stCxn id="10" idx="1"/>
+          </p:cNvCxnSpPr>
+          <p:nvPr/>
+        </p:nvCxnSpPr>
+        <p:spPr>
+          <a:xfrm flipH="1">
+            <a:off x="2374900" y="2954333"/>
+            <a:ext cx="1270000" cy="172691"/>
+          </a:xfrm>
+          <a:prstGeom prst="straightConnector1">
+            <a:avLst/>
+          </a:prstGeom>
+          <a:ln w="25400">
+            <a:solidFill>
+              <a:schemeClr val="tx1"/>
+            </a:solidFill>
+            <a:prstDash val="lgDash"/>
+            <a:headEnd type="none"/>
+            <a:tailEnd type="triangle" w="lg" len="lg"/>
+          </a:ln>
+        </p:spPr>
+        <p:style>
+          <a:lnRef idx="1">
+            <a:schemeClr val="accent1"/>
+          </a:lnRef>
+          <a:fillRef idx="0">
+            <a:schemeClr val="accent1"/>
+          </a:fillRef>
+          <a:effectRef idx="0">
+            <a:schemeClr val="accent1"/>
+          </a:effectRef>
+          <a:fontRef idx="minor">
+            <a:schemeClr val="tx1"/>
+          </a:fontRef>
+        </p:style>
+      </p:cxnSp>
+      <p:cxnSp>
+        <p:nvCxnSpPr>
+          <p:cNvPr id="38" name="Straight Arrow Connector 37">
+            <a:extLst>
+              <a:ext uri="{FF2B5EF4-FFF2-40B4-BE49-F238E27FC236}">
+                <a16:creationId xmlns:a16="http://schemas.microsoft.com/office/drawing/2014/main" id="{0CC92905-CE1E-2C41-8420-83A63424E22A}"/>
+              </a:ext>
+            </a:extLst>
+          </p:cNvPr>
+          <p:cNvCxnSpPr>
+            <a:cxnSpLocks/>
+            <a:stCxn id="11" idx="1"/>
+          </p:cNvCxnSpPr>
+          <p:nvPr/>
+        </p:nvCxnSpPr>
+        <p:spPr>
+          <a:xfrm flipH="1">
+            <a:off x="2374900" y="3677438"/>
+            <a:ext cx="1270000" cy="740963"/>
+          </a:xfrm>
+          <a:prstGeom prst="straightConnector1">
+            <a:avLst/>
+          </a:prstGeom>
+          <a:ln w="25400">
+            <a:solidFill>
+              <a:schemeClr val="tx1"/>
+            </a:solidFill>
+            <a:prstDash val="lgDash"/>
+            <a:headEnd type="none"/>
+            <a:tailEnd type="triangle" w="lg" len="lg"/>
+          </a:ln>
+        </p:spPr>
+        <p:style>
+          <a:lnRef idx="1">
+            <a:schemeClr val="accent1"/>
+          </a:lnRef>
+          <a:fillRef idx="0">
+            <a:schemeClr val="accent1"/>
+          </a:fillRef>
+          <a:effectRef idx="0">
+            <a:schemeClr val="accent1"/>
+          </a:effectRef>
+          <a:fontRef idx="minor">
+            <a:schemeClr val="tx1"/>
+          </a:fontRef>
+        </p:style>
+      </p:cxnSp>
+      <p:cxnSp>
+        <p:nvCxnSpPr>
+          <p:cNvPr id="42" name="Straight Arrow Connector 41">
+            <a:extLst>
+              <a:ext uri="{FF2B5EF4-FFF2-40B4-BE49-F238E27FC236}">
+                <a16:creationId xmlns:a16="http://schemas.microsoft.com/office/drawing/2014/main" id="{C0202091-C7E2-0A41-BE4C-43965FDC2D17}"/>
+              </a:ext>
+            </a:extLst>
+          </p:cNvPr>
+          <p:cNvCxnSpPr>
+            <a:cxnSpLocks/>
+            <a:stCxn id="18" idx="3"/>
+          </p:cNvCxnSpPr>
+          <p:nvPr/>
+        </p:nvCxnSpPr>
+        <p:spPr>
+          <a:xfrm flipV="1">
+            <a:off x="5359400" y="4068617"/>
+            <a:ext cx="1270000" cy="595448"/>
+          </a:xfrm>
+          <a:prstGeom prst="straightConnector1">
+            <a:avLst/>
+          </a:prstGeom>
+          <a:ln w="25400">
+            <a:solidFill>
+              <a:schemeClr val="tx1"/>
+            </a:solidFill>
+            <a:prstDash val="lgDash"/>
+            <a:headEnd type="none"/>
+            <a:tailEnd type="triangle" w="lg" len="lg"/>
+          </a:ln>
+        </p:spPr>
+        <p:style>
+          <a:lnRef idx="1">
+            <a:schemeClr val="accent1"/>
+          </a:lnRef>
+          <a:fillRef idx="0">
+            <a:schemeClr val="accent1"/>
+          </a:fillRef>
+          <a:effectRef idx="0">
+            <a:schemeClr val="accent1"/>
+          </a:effectRef>
+          <a:fontRef idx="minor">
+            <a:schemeClr val="tx1"/>
+          </a:fontRef>
+        </p:style>
+      </p:cxnSp>
     </p:spTree>
     <p:extLst>
       <p:ext uri="{BB962C8B-B14F-4D97-AF65-F5344CB8AC3E}">
@@ -16663,10 +17204,10 @@
       </p:sp>
       <p:pic>
         <p:nvPicPr>
-          <p:cNvPr id="4" name="Picture 3">
+          <p:cNvPr id="5" name="Picture 4">
             <a:extLst>
               <a:ext uri="{FF2B5EF4-FFF2-40B4-BE49-F238E27FC236}">
-                <a16:creationId xmlns:a16="http://schemas.microsoft.com/office/drawing/2014/main" id="{0FF01CC4-1BF1-1B44-847D-A2A73F3BBE55}"/>
+                <a16:creationId xmlns:a16="http://schemas.microsoft.com/office/drawing/2014/main" id="{8A7C0814-7B45-2043-A6A5-D9BAC4A76816}"/>
               </a:ext>
             </a:extLst>
           </p:cNvPr>
@@ -16683,8 +17224,8 @@
         </p:blipFill>
         <p:spPr>
           <a:xfrm>
-            <a:off x="5485426" y="244602"/>
-            <a:ext cx="2985474" cy="6295898"/>
+            <a:off x="5472697" y="217759"/>
+            <a:ext cx="2998203" cy="6322741"/>
           </a:xfrm>
           <a:prstGeom prst="rect">
             <a:avLst/>

</xml_diff>

<commit_message>
refactor and align vocabulary
</commit_message>
<xml_diff>
--- a/Documents/ObjectFlow.pptx
+++ b/Documents/ObjectFlow.pptx
@@ -261,7 +261,7 @@
           <a:p>
             <a:fld id="{1B0CFD80-FBD1-AB49-BE80-B9AD21A11C7F}" type="datetimeFigureOut">
               <a:rPr lang="en-US" smtClean="0"/>
-              <a:t>3/31/22</a:t>
+              <a:t>4/13/22</a:t>
             </a:fld>
             <a:endParaRPr lang="en-US"/>
           </a:p>
@@ -431,7 +431,7 @@
           <a:p>
             <a:fld id="{1B0CFD80-FBD1-AB49-BE80-B9AD21A11C7F}" type="datetimeFigureOut">
               <a:rPr lang="en-US" smtClean="0"/>
-              <a:t>3/31/22</a:t>
+              <a:t>4/13/22</a:t>
             </a:fld>
             <a:endParaRPr lang="en-US"/>
           </a:p>
@@ -611,7 +611,7 @@
           <a:p>
             <a:fld id="{1B0CFD80-FBD1-AB49-BE80-B9AD21A11C7F}" type="datetimeFigureOut">
               <a:rPr lang="en-US" smtClean="0"/>
-              <a:t>3/31/22</a:t>
+              <a:t>4/13/22</a:t>
             </a:fld>
             <a:endParaRPr lang="en-US"/>
           </a:p>
@@ -781,7 +781,7 @@
           <a:p>
             <a:fld id="{1B0CFD80-FBD1-AB49-BE80-B9AD21A11C7F}" type="datetimeFigureOut">
               <a:rPr lang="en-US" smtClean="0"/>
-              <a:t>3/31/22</a:t>
+              <a:t>4/13/22</a:t>
             </a:fld>
             <a:endParaRPr lang="en-US"/>
           </a:p>
@@ -1025,7 +1025,7 @@
           <a:p>
             <a:fld id="{1B0CFD80-FBD1-AB49-BE80-B9AD21A11C7F}" type="datetimeFigureOut">
               <a:rPr lang="en-US" smtClean="0"/>
-              <a:t>3/31/22</a:t>
+              <a:t>4/13/22</a:t>
             </a:fld>
             <a:endParaRPr lang="en-US"/>
           </a:p>
@@ -1257,7 +1257,7 @@
           <a:p>
             <a:fld id="{1B0CFD80-FBD1-AB49-BE80-B9AD21A11C7F}" type="datetimeFigureOut">
               <a:rPr lang="en-US" smtClean="0"/>
-              <a:t>3/31/22</a:t>
+              <a:t>4/13/22</a:t>
             </a:fld>
             <a:endParaRPr lang="en-US"/>
           </a:p>
@@ -1624,7 +1624,7 @@
           <a:p>
             <a:fld id="{1B0CFD80-FBD1-AB49-BE80-B9AD21A11C7F}" type="datetimeFigureOut">
               <a:rPr lang="en-US" smtClean="0"/>
-              <a:t>3/31/22</a:t>
+              <a:t>4/13/22</a:t>
             </a:fld>
             <a:endParaRPr lang="en-US"/>
           </a:p>
@@ -1742,7 +1742,7 @@
           <a:p>
             <a:fld id="{1B0CFD80-FBD1-AB49-BE80-B9AD21A11C7F}" type="datetimeFigureOut">
               <a:rPr lang="en-US" smtClean="0"/>
-              <a:t>3/31/22</a:t>
+              <a:t>4/13/22</a:t>
             </a:fld>
             <a:endParaRPr lang="en-US"/>
           </a:p>
@@ -1837,7 +1837,7 @@
           <a:p>
             <a:fld id="{1B0CFD80-FBD1-AB49-BE80-B9AD21A11C7F}" type="datetimeFigureOut">
               <a:rPr lang="en-US" smtClean="0"/>
-              <a:t>3/31/22</a:t>
+              <a:t>4/13/22</a:t>
             </a:fld>
             <a:endParaRPr lang="en-US"/>
           </a:p>
@@ -2114,7 +2114,7 @@
           <a:p>
             <a:fld id="{1B0CFD80-FBD1-AB49-BE80-B9AD21A11C7F}" type="datetimeFigureOut">
               <a:rPr lang="en-US" smtClean="0"/>
-              <a:t>3/31/22</a:t>
+              <a:t>4/13/22</a:t>
             </a:fld>
             <a:endParaRPr lang="en-US"/>
           </a:p>
@@ -2371,7 +2371,7 @@
           <a:p>
             <a:fld id="{1B0CFD80-FBD1-AB49-BE80-B9AD21A11C7F}" type="datetimeFigureOut">
               <a:rPr lang="en-US" smtClean="0"/>
-              <a:t>3/31/22</a:t>
+              <a:t>4/13/22</a:t>
             </a:fld>
             <a:endParaRPr lang="en-US"/>
           </a:p>
@@ -2584,7 +2584,7 @@
           <a:p>
             <a:fld id="{1B0CFD80-FBD1-AB49-BE80-B9AD21A11C7F}" type="datetimeFigureOut">
               <a:rPr lang="en-US" smtClean="0"/>
-              <a:t>3/31/22</a:t>
+              <a:t>4/13/22</a:t>
             </a:fld>
             <a:endParaRPr lang="en-US"/>
           </a:p>
@@ -5458,7 +5458,18 @@
                   <a:schemeClr val="tx1"/>
                 </a:solidFill>
               </a:rPr>
-              <a:t>Flow UML</a:t>
+              <a:t>YAML UML</a:t>
+            </a:r>
+          </a:p>
+          <a:p>
+            <a:pPr algn="ctr"/>
+            <a:r>
+              <a:rPr lang="en-US" dirty="0">
+                <a:solidFill>
+                  <a:schemeClr val="tx1"/>
+                </a:solidFill>
+              </a:rPr>
+              <a:t>TD</a:t>
             </a:r>
           </a:p>
         </p:txBody>
@@ -5559,8 +5570,8 @@
         </p:nvSpPr>
         <p:spPr>
           <a:xfrm>
-            <a:off x="6283788" y="5296662"/>
-            <a:ext cx="1289049" cy="369332"/>
+            <a:off x="6391738" y="4911790"/>
+            <a:ext cx="1289049" cy="1200329"/>
           </a:xfrm>
           <a:prstGeom prst="rect">
             <a:avLst/>
@@ -5573,10 +5584,43 @@
           </a:bodyPr>
           <a:lstStyle/>
           <a:p>
-            <a:pPr algn="ctr"/>
             <a:r>
               <a:rPr lang="en-US" dirty="0"/>
               <a:t>Documents</a:t>
+            </a:r>
+          </a:p>
+          <a:p>
+            <a:pPr marL="285750" indent="-285750">
+              <a:buFontTx/>
+              <a:buChar char="-"/>
+            </a:pPr>
+            <a:r>
+              <a:rPr lang="en-US" dirty="0"/>
+              <a:t>YAML</a:t>
+            </a:r>
+          </a:p>
+          <a:p>
+            <a:pPr marL="285750" indent="-285750">
+              <a:buFontTx/>
+              <a:buChar char="-"/>
+            </a:pPr>
+            <a:r>
+              <a:rPr lang="en-US" dirty="0"/>
+              <a:t>UML</a:t>
+            </a:r>
+          </a:p>
+          <a:p>
+            <a:pPr marL="285750" indent="-285750">
+              <a:buFontTx/>
+              <a:buChar char="-"/>
+            </a:pPr>
+            <a:r>
+              <a:rPr lang="en-US" dirty="0" err="1"/>
+              <a:t>WoT</a:t>
+            </a:r>
+            <a:r>
+              <a:rPr lang="en-US" dirty="0"/>
+              <a:t> TD</a:t>
             </a:r>
           </a:p>
         </p:txBody>

</xml_diff>